<commit_message>
Archivo 8 Etapa de adecuacion
</commit_message>
<xml_diff>
--- a/8 Etapa de adecuacion.pptx
+++ b/8 Etapa de adecuacion.pptx
@@ -6568,7 +6568,6 @@
               <a:rPr lang="es-MX" sz="2800" dirty="0" smtClean="0"/>
               <a:t>Auditoria en Informática</a:t>
             </a:r>
-            <a:endParaRPr lang="es-MX" sz="2800" dirty="0" smtClean="0"/>
           </a:p>
           <a:p>
             <a:endParaRPr lang="es-MX" dirty="0" smtClean="0"/>
@@ -6596,7 +6595,6 @@
               <a:rPr lang="es-MX" sz="2800" dirty="0" smtClean="0"/>
               <a:t>Luis Carlos Santillán Hernández</a:t>
             </a:r>
-            <a:endParaRPr lang="es-MX" sz="2800" dirty="0" smtClean="0"/>
           </a:p>
           <a:p>
             <a:endParaRPr lang="es-MX" dirty="0"/>
@@ -6617,11 +6615,7 @@
             <a:pPr lvl="6"/>
             <a:r>
               <a:rPr lang="es-MX" sz="2800" dirty="0" smtClean="0"/>
-              <a:t>Leonardo </a:t>
-            </a:r>
-            <a:r>
-              <a:rPr lang="es-MX" sz="2800" dirty="0" smtClean="0"/>
-              <a:t>Javier Lizárraga Quintero</a:t>
+              <a:t>Leonardo Javier Lizárraga Quintero</a:t>
             </a:r>
             <a:endParaRPr lang="es-MX" sz="2800" dirty="0"/>
           </a:p>
@@ -6860,7 +6854,7 @@
         <p:spPr>
           <a:xfrm>
             <a:off x="0" y="0"/>
-            <a:ext cx="9144000" cy="5047536"/>
+            <a:ext cx="9144000" cy="5786199"/>
           </a:xfrm>
           <a:prstGeom prst="rect">
             <a:avLst/>
@@ -6877,9 +6871,25 @@
           </a:p>
           <a:p>
             <a:pPr fontAlgn="base"/>
+            <a:endParaRPr lang="es-ES" sz="1600" dirty="0" smtClean="0"/>
+          </a:p>
+          <a:p>
+            <a:pPr fontAlgn="base"/>
+            <a:endParaRPr lang="es-ES" sz="1600" dirty="0"/>
+          </a:p>
+          <a:p>
+            <a:pPr fontAlgn="base"/>
+            <a:endParaRPr lang="es-ES" sz="1600" smtClean="0"/>
+          </a:p>
+          <a:p>
+            <a:pPr fontAlgn="base"/>
+            <a:r>
+              <a:rPr lang="es-ES" sz="1600" smtClean="0"/>
+              <a:t>Ahora </a:t>
+            </a:r>
             <a:r>
               <a:rPr lang="es-ES" sz="1600" dirty="0"/>
-              <a:t>Ahora bien, a nivel general, una práctica interesante en los proyectos de desarrollo contratados con empresas es que el trabajo sea revisado o auditado por una tercera empresa, garantizando así que los requerimientos del cliente a la final tengan una mayor probabilidad de éxito acierto en su proyecto.</a:t>
+              <a:t>bien, a nivel general, una práctica interesante en los proyectos de desarrollo contratados con empresas es que el trabajo sea revisado o auditado por una tercera empresa, garantizando así que los requerimientos del cliente a la final tengan una mayor probabilidad de éxito acierto en su proyecto.</a:t>
             </a:r>
           </a:p>
           <a:p>

</xml_diff>